<commit_message>
updating slides for notes and example
</commit_message>
<xml_diff>
--- a/ClassMaterials/SimpleObjects/Slides/Part1-TodaysStartup.pptx
+++ b/ClassMaterials/SimpleObjects/Slides/Part1-TodaysStartup.pptx
@@ -1650,7 +1650,7 @@
               <a:pPr>
                 <a:defRPr/>
               </a:pPr>
-              <a:t>Tuesday, November 22, 2022</a:t>
+              <a:t>Tuesday, March 14, 2023</a:t>
             </a:fld>
             <a:endParaRPr lang="en-US"/>
           </a:p>
@@ -1833,7 +1833,7 @@
               <a:pPr>
                 <a:defRPr/>
               </a:pPr>
-              <a:t>Tuesday, November 22, 2022</a:t>
+              <a:t>Tuesday, March 14, 2023</a:t>
             </a:fld>
             <a:endParaRPr lang="en-US"/>
           </a:p>
@@ -4946,6 +4946,15 @@
 </file>
 
 <file path=customXml/item1.xml><?xml version="1.0" encoding="utf-8"?>
+<?mso-contentType ?>
+<FormTemplates xmlns="http://schemas.microsoft.com/sharepoint/v3/contenttype/forms">
+  <Display>DocumentLibraryForm</Display>
+  <Edit>DocumentLibraryForm</Edit>
+  <New>DocumentLibraryForm</New>
+</FormTemplates>
+</file>
+
+<file path=customXml/item2.xml><?xml version="1.0" encoding="utf-8"?>
 <ct:contentTypeSchema xmlns:ct="http://schemas.microsoft.com/office/2006/metadata/contentType" xmlns:ma="http://schemas.microsoft.com/office/2006/metadata/properties/metaAttributes" ct:_="" ma:_="" ma:contentTypeName="Document" ma:contentTypeID="0x0101004285D81DBE5F5A448E892B34D6B8CF20" ma:contentTypeVersion="7" ma:contentTypeDescription="Create a new document." ma:contentTypeScope="" ma:versionID="5d1eb4e46a89551cacffd71f81775a5c">
   <xsd:schema xmlns:xsd="http://www.w3.org/2001/XMLSchema" xmlns:xs="http://www.w3.org/2001/XMLSchema" xmlns:p="http://schemas.microsoft.com/office/2006/metadata/properties" xmlns:ns2="08600313-7276-4ca7-b5d3-7d86193ee0ac" xmlns:ns3="820f9cb1-409d-4c4b-8197-1d4f7dd48124" targetNamespace="http://schemas.microsoft.com/office/2006/metadata/properties" ma:root="true" ma:fieldsID="88f943689c6eba50ac915d805157f594" ns2:_="" ns3:_="">
     <xsd:import namespace="08600313-7276-4ca7-b5d3-7d86193ee0ac"/>
@@ -5114,15 +5123,6 @@
 </ct:contentTypeSchema>
 </file>
 
-<file path=customXml/item2.xml><?xml version="1.0" encoding="utf-8"?>
-<?mso-contentType ?>
-<FormTemplates xmlns="http://schemas.microsoft.com/sharepoint/v3/contenttype/forms">
-  <Display>DocumentLibraryForm</Display>
-  <Edit>DocumentLibraryForm</Edit>
-  <New>DocumentLibraryForm</New>
-</FormTemplates>
-</file>
-
 <file path=customXml/item3.xml><?xml version="1.0" encoding="utf-8"?>
 <p:properties xmlns:p="http://schemas.microsoft.com/office/2006/metadata/properties" xmlns:xsi="http://www.w3.org/2001/XMLSchema-instance" xmlns:pc="http://schemas.microsoft.com/office/infopath/2007/PartnerControls">
   <documentManagement>
@@ -5135,6 +5135,14 @@
 </file>
 
 <file path=customXml/itemProps1.xml><?xml version="1.0" encoding="utf-8"?>
+<ds:datastoreItem xmlns:ds="http://schemas.openxmlformats.org/officeDocument/2006/customXml" ds:itemID="{63A389DE-AA01-4DDE-9AC8-23AA9A07961D}">
+  <ds:schemaRefs>
+    <ds:schemaRef ds:uri="http://schemas.microsoft.com/sharepoint/v3/contenttype/forms"/>
+  </ds:schemaRefs>
+</ds:datastoreItem>
+</file>
+
+<file path=customXml/itemProps2.xml><?xml version="1.0" encoding="utf-8"?>
 <ds:datastoreItem xmlns:ds="http://schemas.openxmlformats.org/officeDocument/2006/customXml" ds:itemID="{84DAE545-BE9D-4229-851A-C94DD8292B95}">
   <ds:schemaRefs>
     <ds:schemaRef ds:uri="http://schemas.microsoft.com/office/2006/metadata/contentType"/>
@@ -5149,14 +5157,6 @@
     <ds:schemaRef ds:uri="http://purl.org/dc/elements/1.1/"/>
     <ds:schemaRef ds:uri="http://purl.org/dc/terms/"/>
     <ds:schemaRef ds:uri="http://schemas.microsoft.com/internal/obd"/>
-  </ds:schemaRefs>
-</ds:datastoreItem>
-</file>
-
-<file path=customXml/itemProps2.xml><?xml version="1.0" encoding="utf-8"?>
-<ds:datastoreItem xmlns:ds="http://schemas.openxmlformats.org/officeDocument/2006/customXml" ds:itemID="{63A389DE-AA01-4DDE-9AC8-23AA9A07961D}">
-  <ds:schemaRefs>
-    <ds:schemaRef ds:uri="http://schemas.microsoft.com/sharepoint/v3/contenttype/forms"/>
   </ds:schemaRefs>
 </ds:datastoreItem>
 </file>

</xml_diff>